<commit_message>
add suspicious  home airports, rework prez with this info
</commit_message>
<xml_diff>
--- a/prez/data_airport_spy_final.pptx
+++ b/prez/data_airport_spy_final.pptx
@@ -176,6 +176,7 @@
 <file path=ppt/revisionInfo.xml><?xml version="1.0" encoding="utf-8"?>
 <p1510:revInfo xmlns:a="http://schemas.openxmlformats.org/drawingml/2006/main" xmlns:r="http://schemas.openxmlformats.org/officeDocument/2006/relationships" xmlns:p1510="http://schemas.microsoft.com/office/powerpoint/2015/10/main">
   <p1510:revLst>
+    <p1510:client id="{2AD44D9A-5019-FBA1-2E68-71760F7A2EC3}" v="5" dt="2025-11-07T13:29:39.867"/>
     <p1510:client id="{950011B5-378E-7B59-D6B8-8384A690BF74}" v="1675" dt="2025-11-06T17:41:42.103"/>
   </p1510:revLst>
 </p1510:revInfo>
@@ -263,7 +264,7 @@
           <a:p>
             <a:fld id="{1FEE3F43-65BD-4C41-B2A5-54A0542B9345}" type="datetimeFigureOut">
               <a:rPr lang="ru-RU" smtClean="0"/>
-              <a:t>06.11.2025</a:t>
+              <a:t>07.11.2025</a:t>
             </a:fld>
             <a:endParaRPr lang="ru-RU"/>
           </a:p>
@@ -388,7 +389,7 @@
           <a:p>
             <a:fld id="{45F25E86-4E3F-4428-9180-C4DFA3507F01}" type="datetimeFigureOut">
               <a:rPr lang="ru-RU" smtClean="0"/>
-              <a:t>06.11.2025</a:t>
+              <a:t>07.11.2025</a:t>
             </a:fld>
             <a:endParaRPr lang="ru-RU"/>
           </a:p>
@@ -613,7 +614,7 @@
           <a:p>
             <a:fld id="{45F25E86-4E3F-4428-9180-C4DFA3507F01}" type="datetimeFigureOut">
               <a:rPr lang="ru-RU" smtClean="0"/>
-              <a:t>06.11.2025</a:t>
+              <a:t>07.11.2025</a:t>
             </a:fld>
             <a:endParaRPr lang="ru-RU"/>
           </a:p>
@@ -1144,7 +1145,7 @@
           <a:p>
             <a:fld id="{45F25E86-4E3F-4428-9180-C4DFA3507F01}" type="datetimeFigureOut">
               <a:rPr lang="ru-RU" smtClean="0"/>
-              <a:t>06.11.2025</a:t>
+              <a:t>07.11.2025</a:t>
             </a:fld>
             <a:endParaRPr lang="ru-RU"/>
           </a:p>
@@ -1357,7 +1358,7 @@
           <a:p>
             <a:fld id="{45F25E86-4E3F-4428-9180-C4DFA3507F01}" type="datetimeFigureOut">
               <a:rPr lang="ru-RU" smtClean="0"/>
-              <a:t>06.11.2025</a:t>
+              <a:t>07.11.2025</a:t>
             </a:fld>
             <a:endParaRPr lang="ru-RU"/>
           </a:p>
@@ -1582,7 +1583,7 @@
           <a:p>
             <a:fld id="{45F25E86-4E3F-4428-9180-C4DFA3507F01}" type="datetimeFigureOut">
               <a:rPr lang="ru-RU" smtClean="0"/>
-              <a:t>06.11.2025</a:t>
+              <a:t>07.11.2025</a:t>
             </a:fld>
             <a:endParaRPr lang="ru-RU"/>
           </a:p>
@@ -1795,7 +1796,7 @@
           <a:p>
             <a:fld id="{45F25E86-4E3F-4428-9180-C4DFA3507F01}" type="datetimeFigureOut">
               <a:rPr lang="ru-RU" smtClean="0"/>
-              <a:t>06.11.2025</a:t>
+              <a:t>07.11.2025</a:t>
             </a:fld>
             <a:endParaRPr lang="ru-RU"/>
           </a:p>
@@ -2020,7 +2021,7 @@
           <a:p>
             <a:fld id="{45F25E86-4E3F-4428-9180-C4DFA3507F01}" type="datetimeFigureOut">
               <a:rPr lang="ru-RU" smtClean="0"/>
-              <a:t>06.11.2025</a:t>
+              <a:t>07.11.2025</a:t>
             </a:fld>
             <a:endParaRPr lang="ru-RU"/>
           </a:p>
@@ -2212,7 +2213,7 @@
           <a:p>
             <a:fld id="{45F25E86-4E3F-4428-9180-C4DFA3507F01}" type="datetimeFigureOut">
               <a:rPr lang="ru-RU" smtClean="0"/>
-              <a:t>06.11.2025</a:t>
+              <a:t>07.11.2025</a:t>
             </a:fld>
             <a:endParaRPr lang="ru-RU"/>
           </a:p>
@@ -2437,7 +2438,7 @@
           <a:p>
             <a:fld id="{45F25E86-4E3F-4428-9180-C4DFA3507F01}" type="datetimeFigureOut">
               <a:rPr lang="ru-RU" smtClean="0"/>
-              <a:t>06.11.2025</a:t>
+              <a:t>07.11.2025</a:t>
             </a:fld>
             <a:endParaRPr lang="ru-RU"/>
           </a:p>
@@ -2629,7 +2630,7 @@
           <a:p>
             <a:fld id="{45F25E86-4E3F-4428-9180-C4DFA3507F01}" type="datetimeFigureOut">
               <a:rPr lang="ru-RU" smtClean="0"/>
-              <a:t>06.11.2025</a:t>
+              <a:t>07.11.2025</a:t>
             </a:fld>
             <a:endParaRPr lang="ru-RU"/>
           </a:p>
@@ -8751,10 +8752,10 @@
       </p:sp>
       <p:pic>
         <p:nvPicPr>
-          <p:cNvPr id="4" name="Рисунок 3" descr="Изображение выглядит как текст, снимок экрана, Шрифт&#10;&#10;Содержимое, созданное искусственным интеллектом, может быть неверным.">
+          <p:cNvPr id="3" name="Рисунок 2" descr="Изображение выглядит как текст, снимок экрана, Шрифт&#10;&#10;Содержимое, созданное искусственным интеллектом, может быть неверным.">
             <a:extLst>
               <a:ext uri="{FF2B5EF4-FFF2-40B4-BE49-F238E27FC236}">
-                <a16:creationId xmlns:a16="http://schemas.microsoft.com/office/drawing/2014/main" id="{A7BBC9C7-A0E5-43E4-2852-A316A43106D2}"/>
+                <a16:creationId xmlns:a16="http://schemas.microsoft.com/office/drawing/2014/main" id="{82588123-5A24-52E5-FAA8-0D11310CF57C}"/>
               </a:ext>
             </a:extLst>
           </p:cNvPr>
@@ -8771,8 +8772,8 @@
         </p:blipFill>
         <p:spPr>
           <a:xfrm>
-            <a:off x="702382" y="1711458"/>
-            <a:ext cx="10172126" cy="3563611"/>
+            <a:off x="168352" y="1824267"/>
+            <a:ext cx="11065755" cy="3411442"/>
           </a:xfrm>
           <a:prstGeom prst="rect">
             <a:avLst/>

</xml_diff>